<commit_message>
modified:   CodeCompletion/SIG Proceedings Template-Jan2015 Zip/pics/synthesizeexample.png 	modified:   CodeCompletion/SIG Proceedings Template-Jan2015 Zip/sig-alternate-sample.log 	modified:   CodeCompletion/SIG Proceedings Template-Jan2015 Zip/sig-alternate-sample.pdf 	modified:   CodeCompletion/SIG Proceedings Template-Jan2015 Zip/sig-alternate-sample.synctex.gz 	modified:   CodeCompletion/SIG Proceedings Template-Jan2015 Zip/sig-alternate-sample.tex 	modified:   CodeCompletion/SIG Proceedings Template-Jan2015 Zip/sig-alternate-sample.tex.bak 	modified:   synthesizeexample.png 	modified:   synthesizeexample.pptx
</commit_message>
<xml_diff>
--- a/synthesizeexample.pptx
+++ b/synthesizeexample.pptx
@@ -2622,14 +2622,51 @@
       <p:grpSpPr/>
       <p:sp>
         <p:nvSpPr>
+          <p:cNvPr id="17" name="椭圆 16"/>
+          <p:cNvSpPr/>
+          <p:nvPr/>
+        </p:nvSpPr>
+        <p:spPr>
+          <a:xfrm>
+            <a:off x="1339215" y="1421765"/>
+            <a:ext cx="6660515" cy="1882775"/>
+          </a:xfrm>
+          <a:prstGeom prst="ellipse">
+            <a:avLst/>
+          </a:prstGeom>
+        </p:spPr>
+        <p:style>
+          <a:lnRef idx="1">
+            <a:schemeClr val="accent6"/>
+          </a:lnRef>
+          <a:fillRef idx="2">
+            <a:schemeClr val="accent6"/>
+          </a:fillRef>
+          <a:effectRef idx="1">
+            <a:schemeClr val="accent6"/>
+          </a:effectRef>
+          <a:fontRef idx="minor">
+            <a:schemeClr val="dk1"/>
+          </a:fontRef>
+        </p:style>
+        <p:txBody>
+          <a:bodyPr rtlCol="0" anchor="ctr"/>
+          <a:p>
+            <a:pPr algn="ctr"/>
+            <a:endParaRPr lang="zh-CN" altLang="en-US"/>
+          </a:p>
+        </p:txBody>
+      </p:sp>
+      <p:sp>
+        <p:nvSpPr>
           <p:cNvPr id="13" name="椭圆 12"/>
           <p:cNvSpPr/>
           <p:nvPr/>
         </p:nvSpPr>
         <p:spPr>
           <a:xfrm>
-            <a:off x="1333500" y="1503045"/>
-            <a:ext cx="5584825" cy="2011045"/>
+            <a:off x="5180330" y="1683385"/>
+            <a:ext cx="1385570" cy="1291590"/>
           </a:xfrm>
           <a:prstGeom prst="ellipse">
             <a:avLst/>
@@ -2665,8 +2702,8 @@
         </p:nvSpPr>
         <p:spPr>
           <a:xfrm>
-            <a:off x="1616710" y="1682750"/>
-            <a:ext cx="3616960" cy="1292860"/>
+            <a:off x="1616710" y="1562100"/>
+            <a:ext cx="3563620" cy="1499870"/>
           </a:xfrm>
           <a:prstGeom prst="ellipse">
             <a:avLst/>
@@ -2702,8 +2739,8 @@
         </p:nvSpPr>
         <p:spPr>
           <a:xfrm>
-            <a:off x="1932940" y="1804035"/>
-            <a:ext cx="1742440" cy="755015"/>
+            <a:off x="1932940" y="1683385"/>
+            <a:ext cx="1742440" cy="1030605"/>
           </a:xfrm>
           <a:prstGeom prst="ellipse">
             <a:avLst/>
@@ -2739,7 +2776,7 @@
         </p:nvSpPr>
         <p:spPr>
           <a:xfrm>
-            <a:off x="2527935" y="2204720"/>
+            <a:off x="2519680" y="2336800"/>
             <a:ext cx="1221740" cy="368300"/>
           </a:xfrm>
           <a:prstGeom prst="rect">
@@ -2822,7 +2859,7 @@
         </p:nvSpPr>
         <p:spPr>
           <a:xfrm>
-            <a:off x="2215515" y="1932305"/>
+            <a:off x="2215515" y="1783715"/>
             <a:ext cx="1377950" cy="368300"/>
           </a:xfrm>
           <a:prstGeom prst="rect">
@@ -2837,7 +2874,7 @@
           <a:p>
             <a:r>
               <a:rPr lang="en-US" altLang="zh-CN"/>
-              <a:t>bound:null</a:t>
+              <a:t>bound:self</a:t>
             </a:r>
             <a:endParaRPr lang="en-US" altLang="zh-CN"/>
           </a:p>
@@ -2851,8 +2888,8 @@
         </p:nvSpPr>
         <p:spPr>
           <a:xfrm>
-            <a:off x="3806190" y="2209165"/>
-            <a:ext cx="1525905" cy="368300"/>
+            <a:off x="3624580" y="2192655"/>
+            <a:ext cx="1612900" cy="368300"/>
           </a:xfrm>
           <a:prstGeom prst="rect">
             <a:avLst/>
@@ -2866,9 +2903,13 @@
           <a:p>
             <a:r>
               <a:rPr lang="zh-CN" altLang="en-US"/>
-              <a:t>@PE &amp;&amp; p()</a:t>
-            </a:r>
-            <a:endParaRPr lang="zh-CN" altLang="en-US"/>
+              <a:t>@PE &amp;&amp; </a:t>
+            </a:r>
+            <a:r>
+              <a:rPr lang="en-US" altLang="zh-CN"/>
+              <a:t>@HO</a:t>
+            </a:r>
+            <a:endParaRPr lang="en-US" altLang="zh-CN"/>
           </a:p>
         </p:txBody>
       </p:sp>
@@ -2880,7 +2921,7 @@
         </p:nvSpPr>
         <p:spPr>
           <a:xfrm>
-            <a:off x="3852545" y="1929765"/>
+            <a:off x="3803015" y="1921510"/>
             <a:ext cx="1377950" cy="368300"/>
           </a:xfrm>
           <a:prstGeom prst="rect">
@@ -2909,7 +2950,7 @@
         </p:nvSpPr>
         <p:spPr>
           <a:xfrm>
-            <a:off x="3000375" y="2542540"/>
+            <a:off x="3000375" y="2625090"/>
             <a:ext cx="1525905" cy="368300"/>
           </a:xfrm>
           <a:prstGeom prst="rect">
@@ -2982,7 +3023,7 @@
                   </a:outerShdw>
                 </a:effectLst>
               </a:rPr>
-              <a:t> &amp;&amp; p()</a:t>
+              <a:t> &amp;&amp; </a:t>
             </a:r>
             <a:endParaRPr lang="zh-CN" altLang="en-US">
               <a:ln w="12700">
@@ -3023,7 +3064,7 @@
         </p:nvSpPr>
         <p:spPr>
           <a:xfrm>
-            <a:off x="5419090" y="2212340"/>
+            <a:off x="6640830" y="2212340"/>
             <a:ext cx="1525905" cy="368300"/>
           </a:xfrm>
           <a:prstGeom prst="rect">
@@ -3060,7 +3101,7 @@
         </p:nvSpPr>
         <p:spPr>
           <a:xfrm>
-            <a:off x="5399405" y="1932940"/>
+            <a:off x="6621145" y="1932940"/>
             <a:ext cx="1377950" cy="368300"/>
           </a:xfrm>
           <a:prstGeom prst="rect">
@@ -3089,7 +3130,7 @@
         </p:nvSpPr>
         <p:spPr>
           <a:xfrm>
-            <a:off x="3502660" y="3041015"/>
+            <a:off x="4057650" y="2919730"/>
             <a:ext cx="1898015" cy="368300"/>
           </a:xfrm>
           <a:prstGeom prst="rect">
@@ -3223,6 +3264,176 @@
                 </a:outerShdw>
               </a:effectLst>
             </a:endParaRPr>
+          </a:p>
+        </p:txBody>
+      </p:sp>
+      <p:sp>
+        <p:nvSpPr>
+          <p:cNvPr id="2" name="文本框 1"/>
+          <p:cNvSpPr txBox="1"/>
+          <p:nvPr/>
+        </p:nvSpPr>
+        <p:spPr>
+          <a:xfrm>
+            <a:off x="5513070" y="2215515"/>
+            <a:ext cx="1525905" cy="368300"/>
+          </a:xfrm>
+          <a:prstGeom prst="rect">
+            <a:avLst/>
+          </a:prstGeom>
+          <a:noFill/>
+        </p:spPr>
+        <p:txBody>
+          <a:bodyPr wrap="square" rtlCol="0">
+            <a:spAutoFit/>
+          </a:bodyPr>
+          <a:p>
+            <a:r>
+              <a:rPr lang="en-US"/>
+              <a:t>   p()</a:t>
+            </a:r>
+            <a:endParaRPr lang="en-US"/>
+          </a:p>
+        </p:txBody>
+      </p:sp>
+      <p:sp>
+        <p:nvSpPr>
+          <p:cNvPr id="3" name="文本框 2"/>
+          <p:cNvSpPr txBox="1"/>
+          <p:nvPr/>
+        </p:nvSpPr>
+        <p:spPr>
+          <a:xfrm>
+            <a:off x="5320030" y="1936115"/>
+            <a:ext cx="1377950" cy="368300"/>
+          </a:xfrm>
+          <a:prstGeom prst="rect">
+            <a:avLst/>
+          </a:prstGeom>
+          <a:noFill/>
+        </p:spPr>
+        <p:txBody>
+          <a:bodyPr wrap="square" rtlCol="0">
+            <a:spAutoFit/>
+          </a:bodyPr>
+          <a:p>
+            <a:r>
+              <a:rPr lang="en-US" altLang="zh-CN"/>
+              <a:t>bound:self</a:t>
+            </a:r>
+            <a:endParaRPr lang="en-US" altLang="zh-CN"/>
+          </a:p>
+        </p:txBody>
+      </p:sp>
+      <p:sp>
+        <p:nvSpPr>
+          <p:cNvPr id="15" name="文本框 14"/>
+          <p:cNvSpPr txBox="1"/>
+          <p:nvPr/>
+        </p:nvSpPr>
+        <p:spPr>
+          <a:xfrm>
+            <a:off x="5664200" y="2542540"/>
+            <a:ext cx="1898015" cy="368300"/>
+          </a:xfrm>
+          <a:prstGeom prst="rect">
+            <a:avLst/>
+          </a:prstGeom>
+          <a:noFill/>
+        </p:spPr>
+        <p:txBody>
+          <a:bodyPr wrap="square" rtlCol="0">
+            <a:spAutoFit/>
+          </a:bodyPr>
+          <a:p>
+            <a:r>
+              <a:rPr lang="zh-CN" altLang="en-US">
+                <a:ln w="12700">
+                  <a:solidFill>
+                    <a:schemeClr val="tx2">
+                      <a:lumMod val="75000"/>
+                    </a:schemeClr>
+                  </a:solidFill>
+                  <a:prstDash val="solid"/>
+                </a:ln>
+                <a:pattFill prst="dkUpDiag">
+                  <a:fgClr>
+                    <a:schemeClr val="tx2"/>
+                  </a:fgClr>
+                  <a:bgClr>
+                    <a:schemeClr val="tx2">
+                      <a:lumMod val="20000"/>
+                      <a:lumOff val="80000"/>
+                    </a:schemeClr>
+                  </a:bgClr>
+                </a:pattFill>
+                <a:effectLst>
+                  <a:outerShdw dist="38100" dir="2640000" algn="bl" rotWithShape="0">
+                    <a:schemeClr val="tx2">
+                      <a:lumMod val="75000"/>
+                    </a:schemeClr>
+                  </a:outerShdw>
+                </a:effectLst>
+              </a:rPr>
+              <a:t>p()</a:t>
+            </a:r>
+            <a:endParaRPr lang="en-US" altLang="zh-CN">
+              <a:ln w="12700">
+                <a:solidFill>
+                  <a:schemeClr val="tx2">
+                    <a:lumMod val="75000"/>
+                  </a:schemeClr>
+                </a:solidFill>
+                <a:prstDash val="solid"/>
+              </a:ln>
+              <a:pattFill prst="dkUpDiag">
+                <a:fgClr>
+                  <a:schemeClr val="tx2"/>
+                </a:fgClr>
+                <a:bgClr>
+                  <a:schemeClr val="tx2">
+                    <a:lumMod val="20000"/>
+                    <a:lumOff val="80000"/>
+                  </a:schemeClr>
+                </a:bgClr>
+              </a:pattFill>
+              <a:effectLst>
+                <a:outerShdw dist="38100" dir="2640000" algn="bl" rotWithShape="0">
+                  <a:schemeClr val="tx2">
+                    <a:lumMod val="75000"/>
+                  </a:schemeClr>
+                </a:outerShdw>
+              </a:effectLst>
+            </a:endParaRPr>
+          </a:p>
+        </p:txBody>
+      </p:sp>
+      <p:sp>
+        <p:nvSpPr>
+          <p:cNvPr id="16" name="文本框 15"/>
+          <p:cNvSpPr txBox="1"/>
+          <p:nvPr/>
+        </p:nvSpPr>
+        <p:spPr>
+          <a:xfrm>
+            <a:off x="2521585" y="2063750"/>
+            <a:ext cx="668655" cy="368300"/>
+          </a:xfrm>
+          <a:prstGeom prst="rect">
+            <a:avLst/>
+          </a:prstGeom>
+          <a:noFill/>
+        </p:spPr>
+        <p:txBody>
+          <a:bodyPr wrap="square" rtlCol="0">
+            <a:spAutoFit/>
+          </a:bodyPr>
+          <a:p>
+            <a:r>
+              <a:rPr lang="en-US"/>
+              <a:t>mi()</a:t>
+            </a:r>
+            <a:endParaRPr lang="en-US"/>
           </a:p>
         </p:txBody>
       </p:sp>

</xml_diff>